<commit_message>
Applied: FHIR-42378, FHIR-42376. Updated figure 1-2 image.
</commit_message>
<xml_diff>
--- a/input/images/Source/vbpr_images.pptx
+++ b/input/images/Source/vbpr_images.pptx
@@ -5,8 +5,9 @@
     <p:sldMasterId id="2147483648" r:id="rId1"/>
   </p:sldMasterIdLst>
   <p:sldIdLst>
-    <p:sldId id="257" r:id="rId2"/>
-    <p:sldId id="256" r:id="rId3"/>
+    <p:sldId id="256" r:id="rId2"/>
+    <p:sldId id="257" r:id="rId3"/>
+    <p:sldId id="258" r:id="rId4"/>
   </p:sldIdLst>
   <p:sldSz cx="12192000" cy="6858000"/>
   <p:notesSz cx="6858000" cy="9144000"/>
@@ -105,6 +106,11 @@
       </a:defRPr>
     </a:lvl9pPr>
   </p:defaultTextStyle>
+  <p:extLst>
+    <p:ext uri="{EFAFB233-063F-42B5-8137-9DF3F51BA10A}">
+      <p15:sldGuideLst xmlns:p15="http://schemas.microsoft.com/office/powerpoint/2012/main"/>
+    </p:ext>
+  </p:extLst>
 </p:presentation>
 </file>
 
@@ -3327,6 +3333,86 @@
           <p:cNvPr id="2" name="Title 1">
             <a:extLst>
               <a:ext uri="{FF2B5EF4-FFF2-40B4-BE49-F238E27FC236}">
+                <a16:creationId xmlns:a16="http://schemas.microsoft.com/office/drawing/2014/main" id="{E415F233-CAB5-5676-91FF-D20480358193}"/>
+              </a:ext>
+            </a:extLst>
+          </p:cNvPr>
+          <p:cNvSpPr>
+            <a:spLocks noGrp="1"/>
+          </p:cNvSpPr>
+          <p:nvPr>
+            <p:ph type="ctrTitle"/>
+          </p:nvPr>
+        </p:nvSpPr>
+        <p:spPr/>
+        <p:txBody>
+          <a:bodyPr/>
+          <a:lstStyle/>
+          <a:p>
+            <a:endParaRPr lang="en-US"/>
+          </a:p>
+        </p:txBody>
+      </p:sp>
+      <p:sp>
+        <p:nvSpPr>
+          <p:cNvPr id="3" name="Subtitle 2">
+            <a:extLst>
+              <a:ext uri="{FF2B5EF4-FFF2-40B4-BE49-F238E27FC236}">
+                <a16:creationId xmlns:a16="http://schemas.microsoft.com/office/drawing/2014/main" id="{9015615A-270C-B2D1-219B-1BB9B4B11D0C}"/>
+              </a:ext>
+            </a:extLst>
+          </p:cNvPr>
+          <p:cNvSpPr>
+            <a:spLocks noGrp="1"/>
+          </p:cNvSpPr>
+          <p:nvPr>
+            <p:ph type="subTitle" idx="1"/>
+          </p:nvPr>
+        </p:nvSpPr>
+        <p:spPr/>
+        <p:txBody>
+          <a:bodyPr/>
+          <a:lstStyle/>
+          <a:p>
+            <a:endParaRPr lang="en-US"/>
+          </a:p>
+        </p:txBody>
+      </p:sp>
+    </p:spTree>
+    <p:extLst>
+      <p:ext uri="{BB962C8B-B14F-4D97-AF65-F5344CB8AC3E}">
+        <p14:creationId xmlns:p14="http://schemas.microsoft.com/office/powerpoint/2010/main" val="1651390798"/>
+      </p:ext>
+    </p:extLst>
+  </p:cSld>
+  <p:clrMapOvr>
+    <a:masterClrMapping/>
+  </p:clrMapOvr>
+</p:sld>
+</file>
+
+<file path=ppt/slides/slide2.xml><?xml version="1.0" encoding="utf-8"?>
+<p:sld xmlns:a="http://schemas.openxmlformats.org/drawingml/2006/main" xmlns:r="http://schemas.openxmlformats.org/officeDocument/2006/relationships" xmlns:p="http://schemas.openxmlformats.org/presentationml/2006/main">
+  <p:cSld>
+    <p:spTree>
+      <p:nvGrpSpPr>
+        <p:cNvPr id="1" name=""/>
+        <p:cNvGrpSpPr/>
+        <p:nvPr/>
+      </p:nvGrpSpPr>
+      <p:grpSpPr>
+        <a:xfrm>
+          <a:off x="0" y="0"/>
+          <a:ext cx="0" cy="0"/>
+          <a:chOff x="0" y="0"/>
+          <a:chExt cx="0" cy="0"/>
+        </a:xfrm>
+      </p:grpSpPr>
+      <p:sp>
+        <p:nvSpPr>
+          <p:cNvPr id="2" name="Title 1">
+            <a:extLst>
+              <a:ext uri="{FF2B5EF4-FFF2-40B4-BE49-F238E27FC236}">
                 <a16:creationId xmlns:a16="http://schemas.microsoft.com/office/drawing/2014/main" id="{35AEC577-3560-8176-C41C-25E9944ADD92}"/>
               </a:ext>
             </a:extLst>
@@ -3791,7 +3877,7 @@
 </p:sld>
 </file>
 
-<file path=ppt/slides/slide2.xml><?xml version="1.0" encoding="utf-8"?>
+<file path=ppt/slides/slide3.xml><?xml version="1.0" encoding="utf-8"?>
 <p:sld xmlns:a="http://schemas.openxmlformats.org/drawingml/2006/main" xmlns:r="http://schemas.openxmlformats.org/officeDocument/2006/relationships" xmlns:p="http://schemas.openxmlformats.org/presentationml/2006/main">
   <p:cSld>
     <p:spTree>
@@ -3813,15 +3899,15 @@
           <p:cNvPr id="2" name="Title 1">
             <a:extLst>
               <a:ext uri="{FF2B5EF4-FFF2-40B4-BE49-F238E27FC236}">
-                <a16:creationId xmlns:a16="http://schemas.microsoft.com/office/drawing/2014/main" id="{E415F233-CAB5-5676-91FF-D20480358193}"/>
-              </a:ext>
-            </a:extLst>
-          </p:cNvPr>
-          <p:cNvSpPr>
-            <a:spLocks noGrp="1"/>
-          </p:cNvSpPr>
-          <p:nvPr>
-            <p:ph type="ctrTitle"/>
+                <a16:creationId xmlns:a16="http://schemas.microsoft.com/office/drawing/2014/main" id="{61539099-F44D-B3E9-759A-CC0AFB288691}"/>
+              </a:ext>
+            </a:extLst>
+          </p:cNvPr>
+          <p:cNvSpPr>
+            <a:spLocks noGrp="1"/>
+          </p:cNvSpPr>
+          <p:nvPr>
+            <p:ph type="title"/>
           </p:nvPr>
         </p:nvSpPr>
         <p:spPr/>
@@ -3833,35 +3919,441 @@
           </a:p>
         </p:txBody>
       </p:sp>
-      <p:sp>
-        <p:nvSpPr>
-          <p:cNvPr id="3" name="Subtitle 2">
-            <a:extLst>
-              <a:ext uri="{FF2B5EF4-FFF2-40B4-BE49-F238E27FC236}">
-                <a16:creationId xmlns:a16="http://schemas.microsoft.com/office/drawing/2014/main" id="{9015615A-270C-B2D1-219B-1BB9B4B11D0C}"/>
-              </a:ext>
-            </a:extLst>
-          </p:cNvPr>
-          <p:cNvSpPr>
-            <a:spLocks noGrp="1"/>
-          </p:cNvSpPr>
-          <p:nvPr>
-            <p:ph type="subTitle" idx="1"/>
-          </p:nvPr>
-        </p:nvSpPr>
-        <p:spPr/>
-        <p:txBody>
-          <a:bodyPr/>
-          <a:lstStyle/>
-          <a:p>
-            <a:endParaRPr lang="en-US"/>
+      <p:pic>
+        <p:nvPicPr>
+          <p:cNvPr id="3" name="Graphic 2">
+            <a:extLst>
+              <a:ext uri="{FF2B5EF4-FFF2-40B4-BE49-F238E27FC236}">
+                <a16:creationId xmlns:a16="http://schemas.microsoft.com/office/drawing/2014/main" id="{B8C1BD8C-D97A-BB1A-3F81-68B77461D2A0}"/>
+              </a:ext>
+            </a:extLst>
+          </p:cNvPr>
+          <p:cNvPicPr>
+            <a:picLocks noChangeAspect="1"/>
+          </p:cNvPicPr>
+          <p:nvPr/>
+        </p:nvPicPr>
+        <p:blipFill>
+          <a:blip r:embed="rId2">
+            <a:extLst>
+              <a:ext uri="{96DAC541-7B7A-43D3-8B79-37D633B846F1}">
+                <asvg:svgBlip xmlns:asvg="http://schemas.microsoft.com/office/drawing/2016/SVG/main" r:embed="rId3"/>
+              </a:ext>
+            </a:extLst>
+          </a:blip>
+          <a:stretch>
+            <a:fillRect/>
+          </a:stretch>
+        </p:blipFill>
+        <p:spPr>
+          <a:xfrm>
+            <a:off x="6672589" y="3695545"/>
+            <a:ext cx="659817" cy="996459"/>
+          </a:xfrm>
+          <a:prstGeom prst="rect">
+            <a:avLst/>
+          </a:prstGeom>
+        </p:spPr>
+      </p:pic>
+      <p:pic>
+        <p:nvPicPr>
+          <p:cNvPr id="4" name="Graphic 3">
+            <a:extLst>
+              <a:ext uri="{FF2B5EF4-FFF2-40B4-BE49-F238E27FC236}">
+                <a16:creationId xmlns:a16="http://schemas.microsoft.com/office/drawing/2014/main" id="{3758382E-6C43-6375-46B2-AB7C2D67AE34}"/>
+              </a:ext>
+            </a:extLst>
+          </p:cNvPr>
+          <p:cNvPicPr>
+            <a:picLocks noChangeAspect="1"/>
+          </p:cNvPicPr>
+          <p:nvPr/>
+        </p:nvPicPr>
+        <p:blipFill>
+          <a:blip r:embed="rId4">
+            <a:extLst>
+              <a:ext uri="{96DAC541-7B7A-43D3-8B79-37D633B846F1}">
+                <asvg:svgBlip xmlns:asvg="http://schemas.microsoft.com/office/drawing/2016/SVG/main" r:embed="rId5"/>
+              </a:ext>
+            </a:extLst>
+          </a:blip>
+          <a:stretch>
+            <a:fillRect/>
+          </a:stretch>
+        </p:blipFill>
+        <p:spPr>
+          <a:xfrm>
+            <a:off x="3531714" y="3743863"/>
+            <a:ext cx="814124" cy="899821"/>
+          </a:xfrm>
+          <a:prstGeom prst="rect">
+            <a:avLst/>
+          </a:prstGeom>
+        </p:spPr>
+      </p:pic>
+      <p:sp>
+        <p:nvSpPr>
+          <p:cNvPr id="5" name="Rounded Rectangle 3">
+            <a:extLst>
+              <a:ext uri="{FF2B5EF4-FFF2-40B4-BE49-F238E27FC236}">
+                <a16:creationId xmlns:a16="http://schemas.microsoft.com/office/drawing/2014/main" id="{FECA27F2-1594-5DA8-56CF-81123089ECCE}"/>
+              </a:ext>
+            </a:extLst>
+          </p:cNvPr>
+          <p:cNvSpPr/>
+          <p:nvPr/>
+        </p:nvSpPr>
+        <p:spPr>
+          <a:xfrm>
+            <a:off x="4490602" y="3229146"/>
+            <a:ext cx="2064066" cy="912005"/>
+          </a:xfrm>
+          <a:prstGeom prst="roundRect">
+            <a:avLst/>
+          </a:prstGeom>
+          <a:solidFill>
+            <a:schemeClr val="accent3">
+              <a:lumMod val="20000"/>
+              <a:lumOff val="80000"/>
+            </a:schemeClr>
+          </a:solidFill>
+          <a:ln w="28575" cap="flat" cmpd="sng" algn="ctr">
+            <a:solidFill>
+              <a:schemeClr val="accent1">
+                <a:lumMod val="20000"/>
+                <a:lumOff val="80000"/>
+              </a:schemeClr>
+            </a:solidFill>
+            <a:prstDash val="solid"/>
+            <a:miter lim="800000"/>
+          </a:ln>
+          <a:effectLst/>
+        </p:spPr>
+        <p:txBody>
+          <a:bodyPr rtlCol="0" anchor="t" anchorCtr="0"/>
+          <a:lstStyle/>
+          <a:p>
+            <a:pPr algn="ctr" defTabSz="609585" fontAlgn="base">
+              <a:spcBef>
+                <a:spcPct val="0"/>
+              </a:spcBef>
+              <a:spcAft>
+                <a:spcPct val="0"/>
+              </a:spcAft>
+              <a:defRPr/>
+            </a:pPr>
+            <a:r>
+              <a:rPr lang="en-US" sz="1200" b="1" dirty="0">
+                <a:solidFill>
+                  <a:prstClr val="black"/>
+                </a:solidFill>
+                <a:latin typeface="Arial" panose="020B0604020202020204" pitchFamily="34" charset="0"/>
+                <a:ea typeface="ヒラギノ角ゴ Pro W3" pitchFamily="-126" charset="-128"/>
+                <a:cs typeface="Arial" panose="020B0604020202020204" pitchFamily="34" charset="0"/>
+              </a:rPr>
+              <a:t>Payer sends payer-generated Value-Based Performance Report in standardized format</a:t>
+            </a:r>
+          </a:p>
+        </p:txBody>
+      </p:sp>
+      <p:pic>
+        <p:nvPicPr>
+          <p:cNvPr id="6" name="Graphic 5">
+            <a:extLst>
+              <a:ext uri="{FF2B5EF4-FFF2-40B4-BE49-F238E27FC236}">
+                <a16:creationId xmlns:a16="http://schemas.microsoft.com/office/drawing/2014/main" id="{28EF7C51-D03F-7C21-EA38-4D2E1800F3A5}"/>
+              </a:ext>
+            </a:extLst>
+          </p:cNvPr>
+          <p:cNvPicPr>
+            <a:picLocks noChangeAspect="1"/>
+          </p:cNvPicPr>
+          <p:nvPr/>
+        </p:nvPicPr>
+        <p:blipFill>
+          <a:blip r:embed="rId6">
+            <a:extLst>
+              <a:ext uri="{96DAC541-7B7A-43D3-8B79-37D633B846F1}">
+                <asvg:svgBlip xmlns:asvg="http://schemas.microsoft.com/office/drawing/2016/SVG/main" r:embed="rId7"/>
+              </a:ext>
+            </a:extLst>
+          </a:blip>
+          <a:stretch>
+            <a:fillRect/>
+          </a:stretch>
+        </p:blipFill>
+        <p:spPr>
+          <a:xfrm>
+            <a:off x="6719332" y="4671082"/>
+            <a:ext cx="566328" cy="499701"/>
+          </a:xfrm>
+          <a:prstGeom prst="rect">
+            <a:avLst/>
+          </a:prstGeom>
+        </p:spPr>
+      </p:pic>
+      <p:cxnSp>
+        <p:nvCxnSpPr>
+          <p:cNvPr id="7" name="Straight Arrow Connector 6">
+            <a:extLst>
+              <a:ext uri="{FF2B5EF4-FFF2-40B4-BE49-F238E27FC236}">
+                <a16:creationId xmlns:a16="http://schemas.microsoft.com/office/drawing/2014/main" id="{F99EDB82-47FD-144B-06B3-CB3AFF6E8BFA}"/>
+              </a:ext>
+            </a:extLst>
+          </p:cNvPr>
+          <p:cNvCxnSpPr>
+            <a:cxnSpLocks/>
+          </p:cNvCxnSpPr>
+          <p:nvPr/>
+        </p:nvCxnSpPr>
+        <p:spPr>
+          <a:xfrm flipH="1">
+            <a:off x="4731518" y="4307840"/>
+            <a:ext cx="1595364" cy="0"/>
+          </a:xfrm>
+          <a:prstGeom prst="straightConnector1">
+            <a:avLst/>
+          </a:prstGeom>
+          <a:ln w="38100">
+            <a:solidFill>
+              <a:schemeClr val="bg1">
+                <a:lumMod val="75000"/>
+              </a:schemeClr>
+            </a:solidFill>
+            <a:headEnd type="triangle" w="med" len="med"/>
+            <a:tailEnd type="none" w="med" len="med"/>
+          </a:ln>
+        </p:spPr>
+        <p:style>
+          <a:lnRef idx="1">
+            <a:schemeClr val="accent1"/>
+          </a:lnRef>
+          <a:fillRef idx="0">
+            <a:schemeClr val="accent1"/>
+          </a:fillRef>
+          <a:effectRef idx="0">
+            <a:schemeClr val="accent1"/>
+          </a:effectRef>
+          <a:fontRef idx="minor">
+            <a:schemeClr val="tx1"/>
+          </a:fontRef>
+        </p:style>
+      </p:cxnSp>
+      <p:sp>
+        <p:nvSpPr>
+          <p:cNvPr id="8" name="TextBox 7">
+            <a:extLst>
+              <a:ext uri="{FF2B5EF4-FFF2-40B4-BE49-F238E27FC236}">
+                <a16:creationId xmlns:a16="http://schemas.microsoft.com/office/drawing/2014/main" id="{958F260A-B76E-AD3F-B3AA-B7734BD52483}"/>
+              </a:ext>
+            </a:extLst>
+          </p:cNvPr>
+          <p:cNvSpPr txBox="1"/>
+          <p:nvPr/>
+        </p:nvSpPr>
+        <p:spPr>
+          <a:xfrm>
+            <a:off x="6399428" y="3370569"/>
+            <a:ext cx="1259821" cy="297454"/>
+          </a:xfrm>
+          <a:prstGeom prst="rect">
+            <a:avLst/>
+          </a:prstGeom>
+          <a:noFill/>
+        </p:spPr>
+        <p:txBody>
+          <a:bodyPr wrap="square" rtlCol="0">
+            <a:spAutoFit/>
+          </a:bodyPr>
+          <a:lstStyle/>
+          <a:p>
+            <a:pPr algn="ctr" defTabSz="609585" fontAlgn="base">
+              <a:spcBef>
+                <a:spcPct val="0"/>
+              </a:spcBef>
+              <a:spcAft>
+                <a:spcPct val="0"/>
+              </a:spcAft>
+              <a:defRPr/>
+            </a:pPr>
+            <a:r>
+              <a:rPr lang="en-US" sz="1333" b="1" dirty="0">
+                <a:solidFill>
+                  <a:srgbClr val="002060"/>
+                </a:solidFill>
+                <a:latin typeface="Arial"/>
+                <a:ea typeface="ヒラギノ角ゴ Pro W3" pitchFamily="-126" charset="-128"/>
+              </a:rPr>
+              <a:t>Provider</a:t>
+            </a:r>
+          </a:p>
+        </p:txBody>
+      </p:sp>
+      <p:sp>
+        <p:nvSpPr>
+          <p:cNvPr id="9" name="Oval 8">
+            <a:extLst>
+              <a:ext uri="{FF2B5EF4-FFF2-40B4-BE49-F238E27FC236}">
+                <a16:creationId xmlns:a16="http://schemas.microsoft.com/office/drawing/2014/main" id="{6FFCF461-89AB-09B9-7F1E-EFD19C3861F9}"/>
+              </a:ext>
+            </a:extLst>
+          </p:cNvPr>
+          <p:cNvSpPr/>
+          <p:nvPr/>
+        </p:nvSpPr>
+        <p:spPr>
+          <a:xfrm>
+            <a:off x="3602164" y="2632870"/>
+            <a:ext cx="3912321" cy="1917711"/>
+          </a:xfrm>
+          <a:prstGeom prst="ellipse">
+            <a:avLst/>
+          </a:prstGeom>
+          <a:noFill/>
+          <a:ln>
+            <a:solidFill>
+              <a:schemeClr val="accent1"/>
+            </a:solidFill>
+          </a:ln>
+        </p:spPr>
+        <p:style>
+          <a:lnRef idx="1">
+            <a:schemeClr val="accent1"/>
+          </a:lnRef>
+          <a:fillRef idx="3">
+            <a:schemeClr val="accent1"/>
+          </a:fillRef>
+          <a:effectRef idx="2">
+            <a:schemeClr val="accent1"/>
+          </a:effectRef>
+          <a:fontRef idx="minor">
+            <a:schemeClr val="lt1"/>
+          </a:fontRef>
+        </p:style>
+        <p:txBody>
+          <a:bodyPr rtlCol="0" anchor="ctr"/>
+          <a:lstStyle/>
+          <a:p>
+            <a:pPr algn="ctr" defTabSz="609585" fontAlgn="base">
+              <a:spcBef>
+                <a:spcPct val="0"/>
+              </a:spcBef>
+              <a:spcAft>
+                <a:spcPct val="0"/>
+              </a:spcAft>
+            </a:pPr>
+            <a:endParaRPr lang="en-US" sz="2400" dirty="0">
+              <a:solidFill>
+                <a:prstClr val="white"/>
+              </a:solidFill>
+              <a:latin typeface="Arial"/>
+            </a:endParaRPr>
+          </a:p>
+        </p:txBody>
+      </p:sp>
+      <p:sp>
+        <p:nvSpPr>
+          <p:cNvPr id="10" name="TextBox 9">
+            <a:extLst>
+              <a:ext uri="{FF2B5EF4-FFF2-40B4-BE49-F238E27FC236}">
+                <a16:creationId xmlns:a16="http://schemas.microsoft.com/office/drawing/2014/main" id="{2C255E97-175A-6AB2-D168-7C4123CB08E2}"/>
+              </a:ext>
+            </a:extLst>
+          </p:cNvPr>
+          <p:cNvSpPr txBox="1"/>
+          <p:nvPr/>
+        </p:nvSpPr>
+        <p:spPr>
+          <a:xfrm>
+            <a:off x="4490602" y="2761731"/>
+            <a:ext cx="1962397" cy="338554"/>
+          </a:xfrm>
+          <a:prstGeom prst="rect">
+            <a:avLst/>
+          </a:prstGeom>
+          <a:noFill/>
+        </p:spPr>
+        <p:txBody>
+          <a:bodyPr wrap="none" rtlCol="0">
+            <a:spAutoFit/>
+          </a:bodyPr>
+          <a:lstStyle/>
+          <a:p>
+            <a:pPr defTabSz="609585" fontAlgn="base">
+              <a:spcBef>
+                <a:spcPct val="0"/>
+              </a:spcBef>
+              <a:spcAft>
+                <a:spcPct val="0"/>
+              </a:spcAft>
+            </a:pPr>
+            <a:r>
+              <a:rPr lang="en-US" sz="1600" b="1" dirty="0">
+                <a:solidFill>
+                  <a:srgbClr val="002060"/>
+                </a:solidFill>
+                <a:latin typeface="Arial" panose="020B0604020202020204" pitchFamily="34" charset="0"/>
+                <a:ea typeface="ヒラギノ角ゴ Pro W3" pitchFamily="-126" charset="-128"/>
+              </a:rPr>
+              <a:t>Phase One (STU1)</a:t>
+            </a:r>
+          </a:p>
+        </p:txBody>
+      </p:sp>
+      <p:sp>
+        <p:nvSpPr>
+          <p:cNvPr id="11" name="TextBox 10">
+            <a:extLst>
+              <a:ext uri="{FF2B5EF4-FFF2-40B4-BE49-F238E27FC236}">
+                <a16:creationId xmlns:a16="http://schemas.microsoft.com/office/drawing/2014/main" id="{EB8B8C3E-5CFF-E97D-A672-515A03CE06CA}"/>
+              </a:ext>
+            </a:extLst>
+          </p:cNvPr>
+          <p:cNvSpPr txBox="1"/>
+          <p:nvPr/>
+        </p:nvSpPr>
+        <p:spPr>
+          <a:xfrm>
+            <a:off x="3358057" y="3340438"/>
+            <a:ext cx="1259821" cy="297454"/>
+          </a:xfrm>
+          <a:prstGeom prst="rect">
+            <a:avLst/>
+          </a:prstGeom>
+          <a:noFill/>
+        </p:spPr>
+        <p:txBody>
+          <a:bodyPr wrap="square" rtlCol="0">
+            <a:spAutoFit/>
+          </a:bodyPr>
+          <a:lstStyle/>
+          <a:p>
+            <a:pPr algn="ctr" defTabSz="609585" fontAlgn="base">
+              <a:spcBef>
+                <a:spcPct val="0"/>
+              </a:spcBef>
+              <a:spcAft>
+                <a:spcPct val="0"/>
+              </a:spcAft>
+              <a:defRPr/>
+            </a:pPr>
+            <a:r>
+              <a:rPr lang="en-US" sz="1333" b="1" dirty="0">
+                <a:solidFill>
+                  <a:srgbClr val="002060"/>
+                </a:solidFill>
+                <a:latin typeface="Arial"/>
+                <a:ea typeface="ヒラギノ角ゴ Pro W3" pitchFamily="-126" charset="-128"/>
+              </a:rPr>
+              <a:t>Payer</a:t>
+            </a:r>
           </a:p>
         </p:txBody>
       </p:sp>
     </p:spTree>
     <p:extLst>
       <p:ext uri="{BB962C8B-B14F-4D97-AF65-F5344CB8AC3E}">
-        <p14:creationId xmlns:p14="http://schemas.microsoft.com/office/powerpoint/2010/main" val="1651390798"/>
+        <p14:creationId xmlns:p14="http://schemas.microsoft.com/office/powerpoint/2010/main" val="2967413927"/>
       </p:ext>
     </p:extLst>
   </p:cSld>

</xml_diff>